<commit_message>
UPDATE: link videos de structs
</commit_message>
<xml_diff>
--- a/material/IntroProg/Clases/Recursion.pptx
+++ b/material/IntroProg/Clases/Recursion.pptx
@@ -5,7 +5,7 @@
     <p:sldMasterId id="2147483648" r:id="rId1"/>
   </p:sldMasterIdLst>
   <p:notesMasterIdLst>
-    <p:notesMasterId r:id="rId10"/>
+    <p:notesMasterId r:id="rId12"/>
   </p:notesMasterIdLst>
   <p:sldIdLst>
     <p:sldId id="365" r:id="rId2"/>
@@ -15,7 +15,9 @@
     <p:sldId id="283" r:id="rId6"/>
     <p:sldId id="284" r:id="rId7"/>
     <p:sldId id="285" r:id="rId8"/>
-    <p:sldId id="286" r:id="rId9"/>
+    <p:sldId id="368" r:id="rId9"/>
+    <p:sldId id="367" r:id="rId10"/>
+    <p:sldId id="369" r:id="rId11"/>
   </p:sldIdLst>
   <p:sldSz cx="9144000" cy="6858000" type="screen4x3"/>
   <p:notesSz cx="6858000" cy="9144000"/>
@@ -2542,7 +2544,7 @@
             <a:fld id="{72F64849-FDB5-4298-A413-9D70FF7B4EB1}" type="datetimeFigureOut">
               <a:rPr lang="es-CO" smtClean="0"/>
               <a:pPr/>
-              <a:t>18/03/2020</a:t>
+              <a:t>19/03/2020</a:t>
             </a:fld>
             <a:endParaRPr lang="es-CO"/>
           </a:p>
@@ -6098,6 +6100,86 @@
 </p:sld>
 </file>
 
+<file path=ppt/slides/slide10.xml><?xml version="1.0" encoding="utf-8"?>
+<p:sld xmlns:a="http://schemas.openxmlformats.org/drawingml/2006/main" xmlns:r="http://schemas.openxmlformats.org/officeDocument/2006/relationships" xmlns:p="http://schemas.openxmlformats.org/presentationml/2006/main">
+  <p:cSld>
+    <p:spTree>
+      <p:nvGrpSpPr>
+        <p:cNvPr id="1" name=""/>
+        <p:cNvGrpSpPr/>
+        <p:nvPr/>
+      </p:nvGrpSpPr>
+      <p:grpSpPr>
+        <a:xfrm>
+          <a:off x="0" y="0"/>
+          <a:ext cx="0" cy="0"/>
+          <a:chOff x="0" y="0"/>
+          <a:chExt cx="0" cy="0"/>
+        </a:xfrm>
+      </p:grpSpPr>
+      <p:sp>
+        <p:nvSpPr>
+          <p:cNvPr id="2" name="Content Placeholder 1">
+            <a:extLst>
+              <a:ext uri="{FF2B5EF4-FFF2-40B4-BE49-F238E27FC236}">
+                <a16:creationId xmlns:a16="http://schemas.microsoft.com/office/drawing/2014/main" id="{840C9D93-8C2B-437A-AE48-41F99E85896F}"/>
+              </a:ext>
+            </a:extLst>
+          </p:cNvPr>
+          <p:cNvSpPr>
+            <a:spLocks noGrp="1"/>
+          </p:cNvSpPr>
+          <p:nvPr>
+            <p:ph idx="1"/>
+          </p:nvPr>
+        </p:nvSpPr>
+        <p:spPr/>
+        <p:txBody>
+          <a:bodyPr/>
+          <a:lstStyle/>
+          <a:p>
+            <a:endParaRPr lang="es-CO"/>
+          </a:p>
+        </p:txBody>
+      </p:sp>
+      <p:sp>
+        <p:nvSpPr>
+          <p:cNvPr id="3" name="Title 2">
+            <a:extLst>
+              <a:ext uri="{FF2B5EF4-FFF2-40B4-BE49-F238E27FC236}">
+                <a16:creationId xmlns:a16="http://schemas.microsoft.com/office/drawing/2014/main" id="{35D55056-D3B0-42E8-9A2A-17694BC32D7F}"/>
+              </a:ext>
+            </a:extLst>
+          </p:cNvPr>
+          <p:cNvSpPr>
+            <a:spLocks noGrp="1"/>
+          </p:cNvSpPr>
+          <p:nvPr>
+            <p:ph type="title"/>
+          </p:nvPr>
+        </p:nvSpPr>
+        <p:spPr/>
+        <p:txBody>
+          <a:bodyPr/>
+          <a:lstStyle/>
+          <a:p>
+            <a:endParaRPr lang="es-CO"/>
+          </a:p>
+        </p:txBody>
+      </p:sp>
+    </p:spTree>
+    <p:extLst>
+      <p:ext uri="{BB962C8B-B14F-4D97-AF65-F5344CB8AC3E}">
+        <p14:creationId xmlns:p14="http://schemas.microsoft.com/office/powerpoint/2010/main" val="4243329924"/>
+      </p:ext>
+    </p:extLst>
+  </p:cSld>
+  <p:clrMapOvr>
+    <a:masterClrMapping/>
+  </p:clrMapOvr>
+</p:sld>
+</file>
+
 <file path=ppt/slides/slide2.xml><?xml version="1.0" encoding="utf-8"?>
 <p:sld xmlns:a="http://schemas.openxmlformats.org/drawingml/2006/main" xmlns:r="http://schemas.openxmlformats.org/officeDocument/2006/relationships" xmlns:p="http://schemas.openxmlformats.org/presentationml/2006/main">
   <p:cSld>
@@ -6654,12 +6736,18 @@
       </p:grpSpPr>
       <p:sp>
         <p:nvSpPr>
-          <p:cNvPr id="3" name="Título 2"/>
-          <p:cNvSpPr>
-            <a:spLocks noGrp="1"/>
-          </p:cNvSpPr>
-          <p:nvPr>
-            <p:ph type="title"/>
+          <p:cNvPr id="2" name="Content Placeholder 1">
+            <a:extLst>
+              <a:ext uri="{FF2B5EF4-FFF2-40B4-BE49-F238E27FC236}">
+                <a16:creationId xmlns:a16="http://schemas.microsoft.com/office/drawing/2014/main" id="{FE826542-EB11-4076-8DAD-918201C26DBD}"/>
+              </a:ext>
+            </a:extLst>
+          </p:cNvPr>
+          <p:cNvSpPr>
+            <a:spLocks noGrp="1"/>
+          </p:cNvSpPr>
+          <p:nvPr>
+            <p:ph idx="1"/>
           </p:nvPr>
         </p:nvSpPr>
         <p:spPr/>
@@ -6667,16 +6755,44 @@
           <a:bodyPr/>
           <a:lstStyle/>
           <a:p>
-            <a:r>
-              <a:rPr lang="es-CO" dirty="0"/>
-              <a:t>¿Qué hace este algoritmo?</a:t>
-            </a:r>
+            <a:endParaRPr lang="es-CO"/>
+          </a:p>
+        </p:txBody>
+      </p:sp>
+      <p:sp>
+        <p:nvSpPr>
+          <p:cNvPr id="3" name="Title 2">
+            <a:extLst>
+              <a:ext uri="{FF2B5EF4-FFF2-40B4-BE49-F238E27FC236}">
+                <a16:creationId xmlns:a16="http://schemas.microsoft.com/office/drawing/2014/main" id="{3B9F7925-42BF-453E-ACB9-AB682CA40BA6}"/>
+              </a:ext>
+            </a:extLst>
+          </p:cNvPr>
+          <p:cNvSpPr>
+            <a:spLocks noGrp="1"/>
+          </p:cNvSpPr>
+          <p:nvPr>
+            <p:ph type="title"/>
+          </p:nvPr>
+        </p:nvSpPr>
+        <p:spPr/>
+        <p:txBody>
+          <a:bodyPr/>
+          <a:lstStyle/>
+          <a:p>
+            <a:endParaRPr lang="es-CO"/>
           </a:p>
         </p:txBody>
       </p:sp>
       <p:pic>
         <p:nvPicPr>
-          <p:cNvPr id="4" name="Imagen 3"/>
+          <p:cNvPr id="4" name="Picture 3">
+            <a:extLst>
+              <a:ext uri="{FF2B5EF4-FFF2-40B4-BE49-F238E27FC236}">
+                <a16:creationId xmlns:a16="http://schemas.microsoft.com/office/drawing/2014/main" id="{A13CB7C8-2682-4CEC-8B71-C8B5415C4901}"/>
+              </a:ext>
+            </a:extLst>
+          </p:cNvPr>
           <p:cNvPicPr>
             <a:picLocks noChangeAspect="1"/>
           </p:cNvPicPr>
@@ -6690,8 +6806,8 @@
         </p:blipFill>
         <p:spPr>
           <a:xfrm>
-            <a:off x="971600" y="1124744"/>
-            <a:ext cx="7438206" cy="4898590"/>
+            <a:off x="692917" y="260648"/>
+            <a:ext cx="7746806" cy="5986574"/>
           </a:xfrm>
           <a:prstGeom prst="rect">
             <a:avLst/>
@@ -6701,7 +6817,98 @@
     </p:spTree>
     <p:extLst>
       <p:ext uri="{BB962C8B-B14F-4D97-AF65-F5344CB8AC3E}">
-        <p14:creationId xmlns:p14="http://schemas.microsoft.com/office/powerpoint/2010/main" val="3505423918"/>
+        <p14:creationId xmlns:p14="http://schemas.microsoft.com/office/powerpoint/2010/main" val="3437098340"/>
+      </p:ext>
+    </p:extLst>
+  </p:cSld>
+  <p:clrMapOvr>
+    <a:masterClrMapping/>
+  </p:clrMapOvr>
+</p:sld>
+</file>
+
+<file path=ppt/slides/slide9.xml><?xml version="1.0" encoding="utf-8"?>
+<p:sld xmlns:a="http://schemas.openxmlformats.org/drawingml/2006/main" xmlns:r="http://schemas.openxmlformats.org/officeDocument/2006/relationships" xmlns:p="http://schemas.openxmlformats.org/presentationml/2006/main">
+  <p:cSld>
+    <p:spTree>
+      <p:nvGrpSpPr>
+        <p:cNvPr id="1" name=""/>
+        <p:cNvGrpSpPr/>
+        <p:nvPr/>
+      </p:nvGrpSpPr>
+      <p:grpSpPr>
+        <a:xfrm>
+          <a:off x="0" y="0"/>
+          <a:ext cx="0" cy="0"/>
+          <a:chOff x="0" y="0"/>
+          <a:chExt cx="0" cy="0"/>
+        </a:xfrm>
+      </p:grpSpPr>
+      <p:sp>
+        <p:nvSpPr>
+          <p:cNvPr id="2" name="Content Placeholder 1">
+            <a:extLst>
+              <a:ext uri="{FF2B5EF4-FFF2-40B4-BE49-F238E27FC236}">
+                <a16:creationId xmlns:a16="http://schemas.microsoft.com/office/drawing/2014/main" id="{38CC6D58-B720-4820-8379-16220C716EB0}"/>
+              </a:ext>
+            </a:extLst>
+          </p:cNvPr>
+          <p:cNvSpPr>
+            <a:spLocks noGrp="1"/>
+          </p:cNvSpPr>
+          <p:nvPr>
+            <p:ph idx="1"/>
+          </p:nvPr>
+        </p:nvSpPr>
+        <p:spPr/>
+        <p:txBody>
+          <a:bodyPr/>
+          <a:lstStyle/>
+          <a:p>
+            <a:r>
+              <a:rPr lang="es-CO" dirty="0"/>
+              <a:t>Si se necesita recordar el valor que tenía un parámetro una vez que se ha producido la vuelta atrás de la recursividad, entonces ha de pasarse como parámetro a la función. </a:t>
+            </a:r>
+          </a:p>
+        </p:txBody>
+      </p:sp>
+      <p:sp>
+        <p:nvSpPr>
+          <p:cNvPr id="3" name="Title 2">
+            <a:extLst>
+              <a:ext uri="{FF2B5EF4-FFF2-40B4-BE49-F238E27FC236}">
+                <a16:creationId xmlns:a16="http://schemas.microsoft.com/office/drawing/2014/main" id="{172D53FB-0BF8-4CBA-BB22-678F4DD70E57}"/>
+              </a:ext>
+            </a:extLst>
+          </p:cNvPr>
+          <p:cNvSpPr>
+            <a:spLocks noGrp="1"/>
+          </p:cNvSpPr>
+          <p:nvPr>
+            <p:ph type="title"/>
+          </p:nvPr>
+        </p:nvSpPr>
+        <p:spPr/>
+        <p:txBody>
+          <a:bodyPr/>
+          <a:lstStyle/>
+          <a:p>
+            <a:r>
+              <a:rPr lang="es-419" dirty="0" err="1"/>
+              <a:t>Tips</a:t>
+            </a:r>
+            <a:r>
+              <a:rPr lang="es-419" dirty="0"/>
+              <a:t> a considerar</a:t>
+            </a:r>
+            <a:endParaRPr lang="es-CO" dirty="0"/>
+          </a:p>
+        </p:txBody>
+      </p:sp>
+    </p:spTree>
+    <p:extLst>
+      <p:ext uri="{BB962C8B-B14F-4D97-AF65-F5344CB8AC3E}">
+        <p14:creationId xmlns:p14="http://schemas.microsoft.com/office/powerpoint/2010/main" val="2233341583"/>
       </p:ext>
     </p:extLst>
   </p:cSld>

</xml_diff>